<commit_message>
feat: jobs get size and modified at file
</commit_message>
<xml_diff>
--- a/storage/app/public/slide/SAMPATI -Tsikitsiky ihany.pptx
+++ b/storage/app/public/slide/SAMPATI -Tsikitsiky ihany.pptx
@@ -305,7 +305,7 @@
                 <a:tabLst/>
                 <a:defRPr/>
               </a:pPr>
-              <a:t>02/11/2023</a:t>
+              <a:t>15/11/2023</a:t>
             </a:fld>
             <a:endParaRPr kumimoji="0" lang="fr-FR" sz="1200" b="0" i="0" u="none" strike="noStrike" kern="1200" cap="none" spc="0" normalizeH="0" baseline="0" noProof="0">
               <a:ln>
@@ -635,7 +635,7 @@
                 <a:tabLst/>
                 <a:defRPr/>
               </a:pPr>
-              <a:t>02/11/2023</a:t>
+              <a:t>15/11/2023</a:t>
             </a:fld>
             <a:endParaRPr kumimoji="0" lang="fr-FR" sz="1200" b="0" i="0" u="none" strike="noStrike" kern="1200" cap="none" spc="0" normalizeH="0" baseline="0" noProof="0">
               <a:ln>
@@ -975,7 +975,7 @@
                 <a:tabLst/>
                 <a:defRPr/>
               </a:pPr>
-              <a:t>02/11/2023</a:t>
+              <a:t>15/11/2023</a:t>
             </a:fld>
             <a:endParaRPr kumimoji="0" lang="fr-FR" sz="1200" b="0" i="0" u="none" strike="noStrike" kern="1200" cap="none" spc="0" normalizeH="0" baseline="0" noProof="0">
               <a:ln>
@@ -1305,7 +1305,7 @@
                 <a:tabLst/>
                 <a:defRPr/>
               </a:pPr>
-              <a:t>02/11/2023</a:t>
+              <a:t>15/11/2023</a:t>
             </a:fld>
             <a:endParaRPr kumimoji="0" lang="fr-FR" sz="1200" b="0" i="0" u="none" strike="noStrike" kern="1200" cap="none" spc="0" normalizeH="0" baseline="0" noProof="0">
               <a:ln>
@@ -1709,7 +1709,7 @@
                 <a:tabLst/>
                 <a:defRPr/>
               </a:pPr>
-              <a:t>02/11/2023</a:t>
+              <a:t>15/11/2023</a:t>
             </a:fld>
             <a:endParaRPr kumimoji="0" lang="fr-FR" sz="1200" b="0" i="0" u="none" strike="noStrike" kern="1200" cap="none" spc="0" normalizeH="0" baseline="0" noProof="0">
               <a:ln>
@@ -2101,7 +2101,7 @@
                 <a:tabLst/>
                 <a:defRPr/>
               </a:pPr>
-              <a:t>02/11/2023</a:t>
+              <a:t>15/11/2023</a:t>
             </a:fld>
             <a:endParaRPr kumimoji="0" lang="fr-FR" sz="1200" b="0" i="0" u="none" strike="noStrike" kern="1200" cap="none" spc="0" normalizeH="0" baseline="0" noProof="0">
               <a:ln>
@@ -2628,7 +2628,7 @@
                 <a:tabLst/>
                 <a:defRPr/>
               </a:pPr>
-              <a:t>02/11/2023</a:t>
+              <a:t>15/11/2023</a:t>
             </a:fld>
             <a:endParaRPr kumimoji="0" lang="fr-FR" sz="1200" b="0" i="0" u="none" strike="noStrike" kern="1200" cap="none" spc="0" normalizeH="0" baseline="0" noProof="0">
               <a:ln>
@@ -2906,7 +2906,7 @@
                 <a:tabLst/>
                 <a:defRPr/>
               </a:pPr>
-              <a:t>02/11/2023</a:t>
+              <a:t>15/11/2023</a:t>
             </a:fld>
             <a:endParaRPr kumimoji="0" lang="fr-FR" sz="1200" b="0" i="0" u="none" strike="noStrike" kern="1200" cap="none" spc="0" normalizeH="0" baseline="0" noProof="0">
               <a:ln>
@@ -3161,7 +3161,7 @@
                 <a:tabLst/>
                 <a:defRPr/>
               </a:pPr>
-              <a:t>02/11/2023</a:t>
+              <a:t>15/11/2023</a:t>
             </a:fld>
             <a:endParaRPr kumimoji="0" lang="fr-FR" sz="1200" b="0" i="0" u="none" strike="noStrike" kern="1200" cap="none" spc="0" normalizeH="0" baseline="0" noProof="0">
               <a:ln>
@@ -3598,7 +3598,7 @@
                 <a:tabLst/>
                 <a:defRPr/>
               </a:pPr>
-              <a:t>02/11/2023</a:t>
+              <a:t>15/11/2023</a:t>
             </a:fld>
             <a:endParaRPr kumimoji="0" lang="fr-FR" sz="1200" b="0" i="0" u="none" strike="noStrike" kern="1200" cap="none" spc="0" normalizeH="0" baseline="0" noProof="0">
               <a:ln>
@@ -4015,7 +4015,7 @@
                 <a:tabLst/>
                 <a:defRPr/>
               </a:pPr>
-              <a:t>02/11/2023</a:t>
+              <a:t>15/11/2023</a:t>
             </a:fld>
             <a:endParaRPr kumimoji="0" lang="fr-FR" sz="1200" b="0" i="0" u="none" strike="noStrike" kern="1200" cap="none" spc="0" normalizeH="0" baseline="0" noProof="0">
               <a:ln>
@@ -4391,7 +4391,7 @@
                 <a:tabLst/>
                 <a:defRPr/>
               </a:pPr>
-              <a:t>02/11/2023</a:t>
+              <a:t>15/11/2023</a:t>
             </a:fld>
             <a:endParaRPr kumimoji="0" lang="fr-FR" sz="1200" b="0" i="0" u="none" strike="noStrike" kern="1200" cap="none" spc="0" normalizeH="0" baseline="0" noProof="0">
               <a:ln>

</xml_diff>